<commit_message>
day4 slide typo fix
</commit_message>
<xml_diff>
--- a/files/day4_materials/slides_day4.pptx
+++ b/files/day4_materials/slides_day4.pptx
@@ -5,7 +5,7 @@
     <p:sldMasterId id="2147483660" r:id="rId1"/>
   </p:sldMasterIdLst>
   <p:notesMasterIdLst>
-    <p:notesMasterId r:id="rId33"/>
+    <p:notesMasterId r:id="rId35"/>
   </p:notesMasterIdLst>
   <p:sldIdLst>
     <p:sldId id="256" r:id="rId2"/>
@@ -23,22 +23,24 @@
     <p:sldId id="306" r:id="rId14"/>
     <p:sldId id="307" r:id="rId15"/>
     <p:sldId id="308" r:id="rId16"/>
-    <p:sldId id="309" r:id="rId17"/>
-    <p:sldId id="280" r:id="rId18"/>
-    <p:sldId id="281" r:id="rId19"/>
-    <p:sldId id="282" r:id="rId20"/>
-    <p:sldId id="283" r:id="rId21"/>
-    <p:sldId id="284" r:id="rId22"/>
-    <p:sldId id="285" r:id="rId23"/>
-    <p:sldId id="286" r:id="rId24"/>
-    <p:sldId id="287" r:id="rId25"/>
-    <p:sldId id="288" r:id="rId26"/>
-    <p:sldId id="289" r:id="rId27"/>
-    <p:sldId id="290" r:id="rId28"/>
-    <p:sldId id="291" r:id="rId29"/>
-    <p:sldId id="292" r:id="rId30"/>
-    <p:sldId id="293" r:id="rId31"/>
-    <p:sldId id="294" r:id="rId32"/>
+    <p:sldId id="310" r:id="rId17"/>
+    <p:sldId id="311" r:id="rId18"/>
+    <p:sldId id="309" r:id="rId19"/>
+    <p:sldId id="280" r:id="rId20"/>
+    <p:sldId id="281" r:id="rId21"/>
+    <p:sldId id="282" r:id="rId22"/>
+    <p:sldId id="283" r:id="rId23"/>
+    <p:sldId id="284" r:id="rId24"/>
+    <p:sldId id="285" r:id="rId25"/>
+    <p:sldId id="286" r:id="rId26"/>
+    <p:sldId id="287" r:id="rId27"/>
+    <p:sldId id="288" r:id="rId28"/>
+    <p:sldId id="289" r:id="rId29"/>
+    <p:sldId id="290" r:id="rId30"/>
+    <p:sldId id="291" r:id="rId31"/>
+    <p:sldId id="292" r:id="rId32"/>
+    <p:sldId id="293" r:id="rId33"/>
+    <p:sldId id="294" r:id="rId34"/>
   </p:sldIdLst>
   <p:sldSz cx="9144000" cy="6858000" type="screen4x3"/>
   <p:notesSz cx="6858000" cy="9144000"/>
@@ -222,7 +224,7 @@
           <a:p>
             <a:fld id="{F833E4A7-8C8F-0444-B05A-6DE0ED7B35B0}" type="datetimeFigureOut">
               <a:rPr lang="en-US" smtClean="0"/>
-              <a:t>5/25/16</a:t>
+              <a:t>5/30/16</a:t>
             </a:fld>
             <a:endParaRPr lang="en-US"/>
           </a:p>
@@ -683,7 +685,7 @@
           <a:p>
             <a:fld id="{CAF647BD-C221-1844-9ED2-A7F7759EF665}" type="datetimeFigureOut">
               <a:rPr lang="en-US" smtClean="0"/>
-              <a:t>5/25/16</a:t>
+              <a:t>5/30/16</a:t>
             </a:fld>
             <a:endParaRPr lang="en-US"/>
           </a:p>
@@ -948,7 +950,7 @@
           <a:p>
             <a:fld id="{CAF647BD-C221-1844-9ED2-A7F7759EF665}" type="datetimeFigureOut">
               <a:rPr lang="en-US" smtClean="0"/>
-              <a:t>5/25/16</a:t>
+              <a:t>5/30/16</a:t>
             </a:fld>
             <a:endParaRPr lang="en-US"/>
           </a:p>
@@ -1123,7 +1125,7 @@
           <a:p>
             <a:fld id="{CAF647BD-C221-1844-9ED2-A7F7759EF665}" type="datetimeFigureOut">
               <a:rPr lang="en-US" smtClean="0"/>
-              <a:t>5/25/16</a:t>
+              <a:t>5/30/16</a:t>
             </a:fld>
             <a:endParaRPr lang="en-US"/>
           </a:p>
@@ -1288,7 +1290,7 @@
           <a:p>
             <a:fld id="{CAF647BD-C221-1844-9ED2-A7F7759EF665}" type="datetimeFigureOut">
               <a:rPr lang="en-US" smtClean="0"/>
-              <a:t>5/25/16</a:t>
+              <a:t>5/30/16</a:t>
             </a:fld>
             <a:endParaRPr lang="en-US"/>
           </a:p>
@@ -1537,7 +1539,7 @@
           <a:p>
             <a:fld id="{CAF647BD-C221-1844-9ED2-A7F7759EF665}" type="datetimeFigureOut">
               <a:rPr lang="en-US" smtClean="0"/>
-              <a:t>5/25/16</a:t>
+              <a:t>5/30/16</a:t>
             </a:fld>
             <a:endParaRPr lang="en-US"/>
           </a:p>
@@ -1820,7 +1822,7 @@
           <a:p>
             <a:fld id="{CAF647BD-C221-1844-9ED2-A7F7759EF665}" type="datetimeFigureOut">
               <a:rPr lang="en-US" smtClean="0"/>
-              <a:t>5/25/16</a:t>
+              <a:t>5/30/16</a:t>
             </a:fld>
             <a:endParaRPr lang="en-US"/>
           </a:p>
@@ -2259,7 +2261,7 @@
           <a:p>
             <a:fld id="{CAF647BD-C221-1844-9ED2-A7F7759EF665}" type="datetimeFigureOut">
               <a:rPr lang="en-US" smtClean="0"/>
-              <a:t>5/25/16</a:t>
+              <a:t>5/30/16</a:t>
             </a:fld>
             <a:endParaRPr lang="en-US"/>
           </a:p>
@@ -2372,7 +2374,7 @@
           <a:p>
             <a:fld id="{CAF647BD-C221-1844-9ED2-A7F7759EF665}" type="datetimeFigureOut">
               <a:rPr lang="en-US" smtClean="0"/>
-              <a:t>5/25/16</a:t>
+              <a:t>5/30/16</a:t>
             </a:fld>
             <a:endParaRPr lang="en-US"/>
           </a:p>
@@ -2462,7 +2464,7 @@
           <a:p>
             <a:fld id="{CAF647BD-C221-1844-9ED2-A7F7759EF665}" type="datetimeFigureOut">
               <a:rPr lang="en-US" smtClean="0"/>
-              <a:t>5/25/16</a:t>
+              <a:t>5/30/16</a:t>
             </a:fld>
             <a:endParaRPr lang="en-US"/>
           </a:p>
@@ -2704,7 +2706,7 @@
           <a:p>
             <a:fld id="{CAF647BD-C221-1844-9ED2-A7F7759EF665}" type="datetimeFigureOut">
               <a:rPr lang="en-US" smtClean="0"/>
-              <a:t>5/25/16</a:t>
+              <a:t>5/30/16</a:t>
             </a:fld>
             <a:endParaRPr lang="en-US"/>
           </a:p>
@@ -2998,7 +3000,7 @@
           <a:p>
             <a:fld id="{CAF647BD-C221-1844-9ED2-A7F7759EF665}" type="datetimeFigureOut">
               <a:rPr lang="en-US" smtClean="0"/>
-              <a:t>5/25/16</a:t>
+              <a:t>5/30/16</a:t>
             </a:fld>
             <a:endParaRPr lang="en-US"/>
           </a:p>
@@ -3292,7 +3294,7 @@
           <a:p>
             <a:fld id="{CAF647BD-C221-1844-9ED2-A7F7759EF665}" type="datetimeFigureOut">
               <a:rPr lang="en-US" smtClean="0"/>
-              <a:t>5/25/16</a:t>
+              <a:t>5/30/16</a:t>
             </a:fld>
             <a:endParaRPr lang="en-US"/>
           </a:p>
@@ -3966,7 +3968,7 @@
                 <a:latin typeface="Monaco"/>
                 <a:cs typeface="Monaco"/>
               </a:rPr>
-              <a:t>.open() </a:t>
+              <a:t>open() </a:t>
             </a:r>
             <a:r>
               <a:rPr lang="en-US" dirty="0" smtClean="0">
@@ -4487,7 +4489,7 @@
                 <a:latin typeface="Monaco"/>
                 <a:cs typeface="Monaco"/>
               </a:rPr>
-              <a:t>.open() </a:t>
+              <a:t>open() </a:t>
             </a:r>
             <a:r>
               <a:rPr lang="en-US" dirty="0" smtClean="0">
@@ -5794,41 +5796,248 @@
             <p:ph type="title"/>
           </p:nvPr>
         </p:nvSpPr>
-        <p:spPr>
-          <a:xfrm>
-            <a:off x="2230714" y="3087537"/>
-            <a:ext cx="4688183" cy="692215"/>
-          </a:xfrm>
-        </p:spPr>
+        <p:spPr/>
         <p:txBody>
           <a:bodyPr/>
           <a:lstStyle/>
           <a:p>
             <a:r>
-              <a:rPr lang="en-US" dirty="0" smtClean="0"/>
-              <a:t>exercise break</a:t>
-            </a:r>
-            <a:endParaRPr lang="en-US" dirty="0"/>
+              <a:rPr lang="en-US"/>
+              <a:t>Without .read() or .readlines()</a:t>
+            </a:r>
+          </a:p>
+        </p:txBody>
+      </p:sp>
+      <p:sp>
+        <p:nvSpPr>
+          <p:cNvPr id="4" name="TextBox 3"/>
+          <p:cNvSpPr txBox="1"/>
+          <p:nvPr/>
+        </p:nvSpPr>
+        <p:spPr>
+          <a:xfrm>
+            <a:off x="457199" y="1727554"/>
+            <a:ext cx="8338444" cy="3416320"/>
+          </a:xfrm>
+          <a:prstGeom prst="rect">
+            <a:avLst/>
+          </a:prstGeom>
+          <a:noFill/>
+        </p:spPr>
+        <p:txBody>
+          <a:bodyPr wrap="square" rtlCol="0">
+            <a:spAutoFit/>
+          </a:bodyPr>
+          <a:lstStyle/>
+          <a:p>
+            <a:r>
+              <a:rPr lang="en-US" dirty="0" smtClean="0">
+                <a:latin typeface="Monaco"/>
+                <a:cs typeface="Monaco"/>
+              </a:rPr>
+              <a:t>filename = "</a:t>
+            </a:r>
+            <a:r>
+              <a:rPr lang="en-US" dirty="0" err="1" smtClean="0">
+                <a:latin typeface="Monaco"/>
+                <a:cs typeface="Monaco"/>
+              </a:rPr>
+              <a:t>my_file.txt</a:t>
+            </a:r>
+            <a:r>
+              <a:rPr lang="en-US" dirty="0" smtClean="0">
+                <a:latin typeface="Monaco"/>
+                <a:cs typeface="Monaco"/>
+              </a:rPr>
+              <a:t>"</a:t>
+            </a:r>
+          </a:p>
+          <a:p>
+            <a:endParaRPr lang="en-US" dirty="0">
+              <a:latin typeface="Monaco"/>
+              <a:cs typeface="Monaco"/>
+            </a:endParaRPr>
+          </a:p>
+          <a:p>
+            <a:r>
+              <a:rPr lang="en-US" dirty="0" smtClean="0">
+                <a:latin typeface="Monaco"/>
+                <a:cs typeface="Monaco"/>
+              </a:rPr>
+              <a:t># Define handle with the </a:t>
+            </a:r>
+            <a:r>
+              <a:rPr lang="en-US" i="1" dirty="0" smtClean="0">
+                <a:latin typeface="Monaco"/>
+                <a:cs typeface="Monaco"/>
+              </a:rPr>
+              <a:t>open() </a:t>
+            </a:r>
+            <a:r>
+              <a:rPr lang="en-US" dirty="0" smtClean="0">
+                <a:latin typeface="Monaco"/>
+                <a:cs typeface="Monaco"/>
+              </a:rPr>
+              <a:t>function</a:t>
+            </a:r>
+          </a:p>
+          <a:p>
+            <a:r>
+              <a:rPr lang="en-US" dirty="0" smtClean="0">
+                <a:latin typeface="Monaco"/>
+                <a:cs typeface="Monaco"/>
+              </a:rPr>
+              <a:t>file_handle = </a:t>
+            </a:r>
+            <a:r>
+              <a:rPr lang="en-US" dirty="0" smtClean="0">
+                <a:solidFill>
+                  <a:srgbClr val="DC5924"/>
+                </a:solidFill>
+                <a:latin typeface="Monaco"/>
+                <a:cs typeface="Monaco"/>
+              </a:rPr>
+              <a:t>open</a:t>
+            </a:r>
+            <a:r>
+              <a:rPr lang="en-US" dirty="0" smtClean="0">
+                <a:latin typeface="Monaco"/>
+                <a:cs typeface="Monaco"/>
+              </a:rPr>
+              <a:t>(filename, </a:t>
+            </a:r>
+            <a:r>
+              <a:rPr lang="en-US" dirty="0" smtClean="0">
+                <a:solidFill>
+                  <a:srgbClr val="DC5924"/>
+                </a:solidFill>
+                <a:latin typeface="Monaco"/>
+                <a:cs typeface="Monaco"/>
+              </a:rPr>
+              <a:t>"r"</a:t>
+            </a:r>
+            <a:r>
+              <a:rPr lang="en-US" dirty="0" smtClean="0">
+                <a:latin typeface="Monaco"/>
+                <a:cs typeface="Monaco"/>
+              </a:rPr>
+              <a:t>)</a:t>
+            </a:r>
+          </a:p>
+          <a:p>
+            <a:endParaRPr lang="en-US" dirty="0">
+              <a:latin typeface="Monaco"/>
+              <a:cs typeface="Monaco"/>
+            </a:endParaRPr>
+          </a:p>
+          <a:p>
+            <a:r>
+              <a:rPr lang="en-US" dirty="0" smtClean="0">
+                <a:latin typeface="Monaco"/>
+                <a:cs typeface="Monaco"/>
+              </a:rPr>
+              <a:t># Loop over file contents directly </a:t>
+            </a:r>
+            <a:r>
+              <a:rPr lang="en-US" i="1" dirty="0">
+                <a:latin typeface="Monaco"/>
+                <a:cs typeface="Monaco"/>
+              </a:rPr>
+              <a:t>while file is open</a:t>
+            </a:r>
+            <a:endParaRPr lang="en-US" dirty="0" smtClean="0">
+              <a:latin typeface="Monaco"/>
+              <a:cs typeface="Monaco"/>
+            </a:endParaRPr>
+          </a:p>
+          <a:p>
+            <a:r>
+              <a:rPr lang="en-US" dirty="0">
+                <a:latin typeface="Monaco"/>
+                <a:cs typeface="Monaco"/>
+              </a:rPr>
+              <a:t>for line in file_handle:</a:t>
+            </a:r>
+          </a:p>
+          <a:p>
+            <a:r>
+              <a:rPr lang="en-US" dirty="0">
+                <a:latin typeface="Monaco"/>
+                <a:cs typeface="Monaco"/>
+              </a:rPr>
+              <a:t>	print(line)</a:t>
+            </a:r>
+            <a:endParaRPr lang="en-US" dirty="0">
+              <a:latin typeface="Monaco"/>
+              <a:cs typeface="Monaco"/>
+            </a:endParaRPr>
+          </a:p>
+          <a:p>
+            <a:endParaRPr lang="en-US" dirty="0" smtClean="0">
+              <a:latin typeface="Monaco"/>
+              <a:cs typeface="Monaco"/>
+            </a:endParaRPr>
+          </a:p>
+          <a:p>
+            <a:r>
+              <a:rPr lang="en-US" dirty="0" smtClean="0">
+                <a:latin typeface="Monaco"/>
+                <a:cs typeface="Monaco"/>
+              </a:rPr>
+              <a:t># Close the file when done with the </a:t>
+            </a:r>
+            <a:r>
+              <a:rPr lang="en-US" i="1" dirty="0" smtClean="0">
+                <a:latin typeface="Monaco"/>
+                <a:cs typeface="Monaco"/>
+              </a:rPr>
+              <a:t>.close()</a:t>
+            </a:r>
+            <a:r>
+              <a:rPr lang="en-US" dirty="0" smtClean="0">
+                <a:latin typeface="Monaco"/>
+                <a:cs typeface="Monaco"/>
+              </a:rPr>
+              <a:t> method</a:t>
+            </a:r>
+          </a:p>
+          <a:p>
+            <a:r>
+              <a:rPr lang="en-US" dirty="0" smtClean="0">
+                <a:latin typeface="Monaco"/>
+                <a:cs typeface="Monaco"/>
+              </a:rPr>
+              <a:t>file_handle</a:t>
+            </a:r>
+            <a:r>
+              <a:rPr lang="en-US" dirty="0" smtClean="0">
+                <a:solidFill>
+                  <a:srgbClr val="DC5924"/>
+                </a:solidFill>
+                <a:latin typeface="Monaco"/>
+                <a:cs typeface="Monaco"/>
+              </a:rPr>
+              <a:t>.close()</a:t>
+            </a:r>
+          </a:p>
+          <a:p>
+            <a:endParaRPr lang="en-US" dirty="0" smtClean="0">
+              <a:latin typeface="Monaco"/>
+              <a:cs typeface="Monaco"/>
+            </a:endParaRPr>
           </a:p>
         </p:txBody>
       </p:sp>
     </p:spTree>
     <p:extLst>
       <p:ext uri="{BB962C8B-B14F-4D97-AF65-F5344CB8AC3E}">
-        <p14:creationId xmlns:p14="http://schemas.microsoft.com/office/powerpoint/2010/main" val="1798055135"/>
+        <p14:creationId xmlns:p14="http://schemas.microsoft.com/office/powerpoint/2010/main" val="1500111869"/>
       </p:ext>
     </p:extLst>
   </p:cSld>
   <p:clrMapOvr>
     <a:masterClrMapping/>
   </p:clrMapOvr>
-  <p:timing>
-    <p:tnLst>
-      <p:par>
-        <p:cTn xmlns:p14="http://schemas.microsoft.com/office/powerpoint/2010/main" id="1" dur="indefinite" restart="never" nodeType="tmRoot"/>
-      </p:par>
-    </p:tnLst>
-  </p:timing>
 </p:sld>
 </file>
 
@@ -5859,69 +6068,309 @@
             <p:ph type="title"/>
           </p:nvPr>
         </p:nvSpPr>
-        <p:spPr/>
+        <p:spPr>
+          <a:xfrm>
+            <a:off x="457199" y="838370"/>
+            <a:ext cx="7620001" cy="685947"/>
+          </a:xfrm>
+        </p:spPr>
         <p:txBody>
           <a:bodyPr/>
           <a:lstStyle/>
           <a:p>
             <a:r>
-              <a:rPr lang="en-US" dirty="0" smtClean="0"/>
-              <a:t>some useful functions</a:t>
-            </a:r>
-            <a:endParaRPr lang="en-US" dirty="0"/>
+              <a:rPr lang="en-US"/>
+              <a:t>Use .seek() to loop again</a:t>
+            </a:r>
           </a:p>
         </p:txBody>
       </p:sp>
       <p:sp>
         <p:nvSpPr>
-          <p:cNvPr id="3" name="Content Placeholder 2"/>
-          <p:cNvSpPr>
-            <a:spLocks noGrp="1"/>
-          </p:cNvSpPr>
-          <p:nvPr>
-            <p:ph idx="1"/>
-          </p:nvPr>
+          <p:cNvPr id="4" name="TextBox 3"/>
+          <p:cNvSpPr txBox="1"/>
+          <p:nvPr/>
         </p:nvSpPr>
-        <p:spPr/>
+        <p:spPr>
+          <a:xfrm>
+            <a:off x="457199" y="1727554"/>
+            <a:ext cx="8338444" cy="4801315"/>
+          </a:xfrm>
+          <a:prstGeom prst="rect">
+            <a:avLst/>
+          </a:prstGeom>
+          <a:noFill/>
+        </p:spPr>
         <p:txBody>
-          <a:bodyPr/>
+          <a:bodyPr wrap="square" rtlCol="0">
+            <a:spAutoFit/>
+          </a:bodyPr>
           <a:lstStyle/>
           <a:p>
-            <a:pPr marL="457200" indent="-457200">
-              <a:buFont typeface="Arial"/>
-              <a:buChar char="•"/>
-            </a:pPr>
-            <a:r>
-              <a:rPr lang="en-US" dirty="0" smtClean="0">
-                <a:latin typeface="Monaco"/>
-                <a:cs typeface="Monaco"/>
-              </a:rPr>
-              <a:t>help()</a:t>
-            </a:r>
-            <a:r>
-              <a:rPr lang="en-US" dirty="0" smtClean="0"/>
-              <a:t> will return information about a particular function</a:t>
-            </a:r>
+            <a:r>
+              <a:rPr lang="en-US" dirty="0" smtClean="0">
+                <a:latin typeface="Monaco"/>
+                <a:cs typeface="Monaco"/>
+              </a:rPr>
+              <a:t>filename = "</a:t>
+            </a:r>
+            <a:r>
+              <a:rPr lang="en-US" dirty="0" err="1" smtClean="0">
+                <a:latin typeface="Monaco"/>
+                <a:cs typeface="Monaco"/>
+              </a:rPr>
+              <a:t>my_file.txt</a:t>
+            </a:r>
+            <a:r>
+              <a:rPr lang="en-US" dirty="0" smtClean="0">
+                <a:latin typeface="Monaco"/>
+                <a:cs typeface="Monaco"/>
+              </a:rPr>
+              <a:t>"</a:t>
+            </a:r>
+          </a:p>
+          <a:p>
+            <a:endParaRPr lang="en-US" dirty="0">
+              <a:latin typeface="Monaco"/>
+              <a:cs typeface="Monaco"/>
+            </a:endParaRPr>
+          </a:p>
+          <a:p>
+            <a:r>
+              <a:rPr lang="en-US" dirty="0" smtClean="0">
+                <a:latin typeface="Monaco"/>
+                <a:cs typeface="Monaco"/>
+              </a:rPr>
+              <a:t># Define handle with the </a:t>
+            </a:r>
+            <a:r>
+              <a:rPr lang="en-US" i="1" dirty="0" smtClean="0">
+                <a:latin typeface="Monaco"/>
+                <a:cs typeface="Monaco"/>
+              </a:rPr>
+              <a:t>open() </a:t>
+            </a:r>
+            <a:r>
+              <a:rPr lang="en-US" dirty="0" smtClean="0">
+                <a:latin typeface="Monaco"/>
+                <a:cs typeface="Monaco"/>
+              </a:rPr>
+              <a:t>function</a:t>
+            </a:r>
+          </a:p>
+          <a:p>
+            <a:r>
+              <a:rPr lang="en-US" dirty="0" smtClean="0">
+                <a:latin typeface="Monaco"/>
+                <a:cs typeface="Monaco"/>
+              </a:rPr>
+              <a:t>file_handle = </a:t>
+            </a:r>
+            <a:r>
+              <a:rPr lang="en-US" dirty="0" smtClean="0">
+                <a:solidFill>
+                  <a:srgbClr val="DC5924"/>
+                </a:solidFill>
+                <a:latin typeface="Monaco"/>
+                <a:cs typeface="Monaco"/>
+              </a:rPr>
+              <a:t>open</a:t>
+            </a:r>
+            <a:r>
+              <a:rPr lang="en-US" dirty="0" smtClean="0">
+                <a:latin typeface="Monaco"/>
+                <a:cs typeface="Monaco"/>
+              </a:rPr>
+              <a:t>(filename, </a:t>
+            </a:r>
+            <a:r>
+              <a:rPr lang="en-US" dirty="0" smtClean="0">
+                <a:solidFill>
+                  <a:srgbClr val="DC5924"/>
+                </a:solidFill>
+                <a:latin typeface="Monaco"/>
+                <a:cs typeface="Monaco"/>
+              </a:rPr>
+              <a:t>"r"</a:t>
+            </a:r>
+            <a:r>
+              <a:rPr lang="en-US" dirty="0" smtClean="0">
+                <a:latin typeface="Monaco"/>
+                <a:cs typeface="Monaco"/>
+              </a:rPr>
+              <a:t>)</a:t>
+            </a:r>
+          </a:p>
+          <a:p>
+            <a:endParaRPr lang="en-US" dirty="0">
+              <a:latin typeface="Monaco"/>
+              <a:cs typeface="Monaco"/>
+            </a:endParaRPr>
+          </a:p>
+          <a:p>
+            <a:r>
+              <a:rPr lang="en-US" dirty="0" smtClean="0">
+                <a:latin typeface="Monaco"/>
+                <a:cs typeface="Monaco"/>
+              </a:rPr>
+              <a:t># Loop over file contents directly </a:t>
+            </a:r>
+            <a:r>
+              <a:rPr lang="en-US" i="1" dirty="0">
+                <a:latin typeface="Monaco"/>
+                <a:cs typeface="Monaco"/>
+              </a:rPr>
+              <a:t>while file is open</a:t>
+            </a:r>
+            <a:endParaRPr lang="en-US" dirty="0" smtClean="0">
+              <a:latin typeface="Monaco"/>
+              <a:cs typeface="Monaco"/>
+            </a:endParaRPr>
+          </a:p>
+          <a:p>
+            <a:r>
+              <a:rPr lang="en-US" dirty="0">
+                <a:latin typeface="Monaco"/>
+                <a:cs typeface="Monaco"/>
+              </a:rPr>
+              <a:t>for line in file_handle:</a:t>
+            </a:r>
+          </a:p>
+          <a:p>
+            <a:r>
+              <a:rPr lang="en-US" dirty="0">
+                <a:latin typeface="Monaco"/>
+                <a:cs typeface="Monaco"/>
+              </a:rPr>
+              <a:t>	print(line)</a:t>
+            </a:r>
+          </a:p>
+          <a:p>
+            <a:endParaRPr lang="en-US" dirty="0">
+              <a:latin typeface="Monaco"/>
+              <a:cs typeface="Monaco"/>
+            </a:endParaRPr>
+          </a:p>
+          <a:p>
+            <a:r>
+              <a:rPr lang="en-US" dirty="0">
+                <a:latin typeface="Monaco"/>
+                <a:cs typeface="Monaco"/>
+              </a:rPr>
+              <a:t># Reset to the beginning of the file to loop again</a:t>
+            </a:r>
+            <a:endParaRPr lang="en-US" dirty="0">
+              <a:latin typeface="Monaco"/>
+              <a:cs typeface="Monaco"/>
+            </a:endParaRPr>
+          </a:p>
+          <a:p>
+            <a:r>
+              <a:rPr lang="en-US" dirty="0">
+                <a:latin typeface="Monaco"/>
+                <a:cs typeface="Monaco"/>
+              </a:rPr>
+              <a:t>file_handle</a:t>
+            </a:r>
+            <a:r>
+              <a:rPr lang="en-US" dirty="0">
+                <a:solidFill>
+                  <a:schemeClr val="accent5"/>
+                </a:solidFill>
+                <a:latin typeface="Monaco"/>
+                <a:cs typeface="Monaco"/>
+              </a:rPr>
+              <a:t>.seek(0)</a:t>
+            </a:r>
+            <a:endParaRPr lang="en-US" dirty="0" smtClean="0">
+              <a:latin typeface="Monaco"/>
+              <a:cs typeface="Monaco"/>
+            </a:endParaRPr>
+          </a:p>
+          <a:p>
+            <a:r>
+              <a:rPr lang="en-US" dirty="0">
+                <a:latin typeface="Monaco"/>
+                <a:cs typeface="Monaco"/>
+              </a:rPr>
+              <a:t>for line in file_handle:</a:t>
+            </a:r>
+          </a:p>
+          <a:p>
+            <a:r>
+              <a:rPr lang="en-US" dirty="0">
+                <a:latin typeface="Monaco"/>
+                <a:cs typeface="Monaco"/>
+              </a:rPr>
+              <a:t>	print(line)</a:t>
+            </a:r>
+          </a:p>
+          <a:p>
+            <a:endParaRPr lang="en-US" dirty="0" smtClean="0">
+              <a:latin typeface="Monaco"/>
+              <a:cs typeface="Monaco"/>
+            </a:endParaRPr>
+          </a:p>
+          <a:p>
+            <a:r>
+              <a:rPr lang="en-US" dirty="0" smtClean="0">
+                <a:latin typeface="Monaco"/>
+                <a:cs typeface="Monaco"/>
+              </a:rPr>
+              <a:t># Close the file when done with the </a:t>
+            </a:r>
+            <a:r>
+              <a:rPr lang="en-US" i="1" dirty="0" smtClean="0">
+                <a:latin typeface="Monaco"/>
+                <a:cs typeface="Monaco"/>
+              </a:rPr>
+              <a:t>.close()</a:t>
+            </a:r>
+            <a:r>
+              <a:rPr lang="en-US" dirty="0" smtClean="0">
+                <a:latin typeface="Monaco"/>
+                <a:cs typeface="Monaco"/>
+              </a:rPr>
+              <a:t> method</a:t>
+            </a:r>
+          </a:p>
+          <a:p>
+            <a:r>
+              <a:rPr lang="en-US" dirty="0" smtClean="0">
+                <a:latin typeface="Monaco"/>
+                <a:cs typeface="Monaco"/>
+              </a:rPr>
+              <a:t>file_handle</a:t>
+            </a:r>
+            <a:r>
+              <a:rPr lang="en-US" dirty="0" smtClean="0">
+                <a:solidFill>
+                  <a:srgbClr val="DC5924"/>
+                </a:solidFill>
+                <a:latin typeface="Monaco"/>
+                <a:cs typeface="Monaco"/>
+              </a:rPr>
+              <a:t>.close()</a:t>
+            </a:r>
+          </a:p>
+          <a:p>
+            <a:endParaRPr lang="en-US" dirty="0" smtClean="0">
+              <a:latin typeface="Monaco"/>
+              <a:cs typeface="Monaco"/>
+            </a:endParaRPr>
           </a:p>
         </p:txBody>
       </p:sp>
     </p:spTree>
     <p:extLst>
       <p:ext uri="{BB962C8B-B14F-4D97-AF65-F5344CB8AC3E}">
-        <p14:creationId xmlns:p14="http://schemas.microsoft.com/office/powerpoint/2010/main" val="1322254366"/>
+        <p14:creationId xmlns:p14="http://schemas.microsoft.com/office/powerpoint/2010/main" val="172147434"/>
       </p:ext>
     </p:extLst>
   </p:cSld>
   <p:clrMapOvr>
     <a:masterClrMapping/>
   </p:clrMapOvr>
-  <p:timing>
-    <p:tnLst>
-      <p:par>
-        <p:cTn xmlns:p14="http://schemas.microsoft.com/office/powerpoint/2010/main" id="1" dur="indefinite" restart="never" nodeType="tmRoot"/>
-      </p:par>
-    </p:tnLst>
-  </p:timing>
 </p:sld>
 </file>
 
@@ -5952,6 +6401,251 @@
             <p:ph type="title"/>
           </p:nvPr>
         </p:nvSpPr>
+        <p:spPr>
+          <a:xfrm>
+            <a:off x="2230714" y="3087537"/>
+            <a:ext cx="4688183" cy="692215"/>
+          </a:xfrm>
+        </p:spPr>
+        <p:txBody>
+          <a:bodyPr/>
+          <a:lstStyle/>
+          <a:p>
+            <a:r>
+              <a:rPr lang="en-US" dirty="0" smtClean="0"/>
+              <a:t>exercise break</a:t>
+            </a:r>
+            <a:endParaRPr lang="en-US" dirty="0"/>
+          </a:p>
+        </p:txBody>
+      </p:sp>
+    </p:spTree>
+    <p:extLst>
+      <p:ext uri="{BB962C8B-B14F-4D97-AF65-F5344CB8AC3E}">
+        <p14:creationId xmlns:p14="http://schemas.microsoft.com/office/powerpoint/2010/main" val="1798055135"/>
+      </p:ext>
+    </p:extLst>
+  </p:cSld>
+  <p:clrMapOvr>
+    <a:masterClrMapping/>
+  </p:clrMapOvr>
+  <p:timing>
+    <p:tnLst>
+      <p:par>
+        <p:cTn xmlns:p14="http://schemas.microsoft.com/office/powerpoint/2010/main" id="1" dur="indefinite" restart="never" nodeType="tmRoot"/>
+      </p:par>
+    </p:tnLst>
+  </p:timing>
+</p:sld>
+</file>
+
+<file path=ppt/slides/slide19.xml><?xml version="1.0" encoding="utf-8"?>
+<p:sld xmlns:a="http://schemas.openxmlformats.org/drawingml/2006/main" xmlns:r="http://schemas.openxmlformats.org/officeDocument/2006/relationships" xmlns:p="http://schemas.openxmlformats.org/presentationml/2006/main">
+  <p:cSld>
+    <p:spTree>
+      <p:nvGrpSpPr>
+        <p:cNvPr id="1" name=""/>
+        <p:cNvGrpSpPr/>
+        <p:nvPr/>
+      </p:nvGrpSpPr>
+      <p:grpSpPr>
+        <a:xfrm>
+          <a:off x="0" y="0"/>
+          <a:ext cx="0" cy="0"/>
+          <a:chOff x="0" y="0"/>
+          <a:chExt cx="0" cy="0"/>
+        </a:xfrm>
+      </p:grpSpPr>
+      <p:sp>
+        <p:nvSpPr>
+          <p:cNvPr id="2" name="Title 1"/>
+          <p:cNvSpPr>
+            <a:spLocks noGrp="1"/>
+          </p:cNvSpPr>
+          <p:nvPr>
+            <p:ph type="title"/>
+          </p:nvPr>
+        </p:nvSpPr>
+        <p:spPr/>
+        <p:txBody>
+          <a:bodyPr/>
+          <a:lstStyle/>
+          <a:p>
+            <a:r>
+              <a:rPr lang="en-US" dirty="0" smtClean="0"/>
+              <a:t>some useful functions</a:t>
+            </a:r>
+            <a:endParaRPr lang="en-US" dirty="0"/>
+          </a:p>
+        </p:txBody>
+      </p:sp>
+      <p:sp>
+        <p:nvSpPr>
+          <p:cNvPr id="3" name="Content Placeholder 2"/>
+          <p:cNvSpPr>
+            <a:spLocks noGrp="1"/>
+          </p:cNvSpPr>
+          <p:nvPr>
+            <p:ph idx="1"/>
+          </p:nvPr>
+        </p:nvSpPr>
+        <p:spPr/>
+        <p:txBody>
+          <a:bodyPr/>
+          <a:lstStyle/>
+          <a:p>
+            <a:pPr marL="457200" indent="-457200">
+              <a:buFont typeface="Arial"/>
+              <a:buChar char="•"/>
+            </a:pPr>
+            <a:r>
+              <a:rPr lang="en-US" dirty="0" smtClean="0">
+                <a:latin typeface="Monaco"/>
+                <a:cs typeface="Monaco"/>
+              </a:rPr>
+              <a:t>help()</a:t>
+            </a:r>
+            <a:r>
+              <a:rPr lang="en-US" dirty="0" smtClean="0"/>
+              <a:t> will return information about a particular function</a:t>
+            </a:r>
+          </a:p>
+        </p:txBody>
+      </p:sp>
+    </p:spTree>
+    <p:extLst>
+      <p:ext uri="{BB962C8B-B14F-4D97-AF65-F5344CB8AC3E}">
+        <p14:creationId xmlns:p14="http://schemas.microsoft.com/office/powerpoint/2010/main" val="1322254366"/>
+      </p:ext>
+    </p:extLst>
+  </p:cSld>
+  <p:clrMapOvr>
+    <a:masterClrMapping/>
+  </p:clrMapOvr>
+  <p:timing>
+    <p:tnLst>
+      <p:par>
+        <p:cTn xmlns:p14="http://schemas.microsoft.com/office/powerpoint/2010/main" id="1" dur="indefinite" restart="never" nodeType="tmRoot"/>
+      </p:par>
+    </p:tnLst>
+  </p:timing>
+</p:sld>
+</file>
+
+<file path=ppt/slides/slide2.xml><?xml version="1.0" encoding="utf-8"?>
+<p:sld xmlns:a="http://schemas.openxmlformats.org/drawingml/2006/main" xmlns:r="http://schemas.openxmlformats.org/officeDocument/2006/relationships" xmlns:p="http://schemas.openxmlformats.org/presentationml/2006/main">
+  <p:cSld>
+    <p:spTree>
+      <p:nvGrpSpPr>
+        <p:cNvPr id="1" name=""/>
+        <p:cNvGrpSpPr/>
+        <p:nvPr/>
+      </p:nvGrpSpPr>
+      <p:grpSpPr>
+        <a:xfrm>
+          <a:off x="0" y="0"/>
+          <a:ext cx="0" cy="0"/>
+          <a:chOff x="0" y="0"/>
+          <a:chExt cx="0" cy="0"/>
+        </a:xfrm>
+      </p:grpSpPr>
+      <p:sp>
+        <p:nvSpPr>
+          <p:cNvPr id="2" name="Title 1"/>
+          <p:cNvSpPr>
+            <a:spLocks noGrp="1"/>
+          </p:cNvSpPr>
+          <p:nvPr>
+            <p:ph type="title"/>
+          </p:nvPr>
+        </p:nvSpPr>
+        <p:spPr/>
+        <p:txBody>
+          <a:bodyPr/>
+          <a:lstStyle/>
+          <a:p>
+            <a:r>
+              <a:rPr lang="en-US" dirty="0" smtClean="0"/>
+              <a:t>reading and writing files in python</a:t>
+            </a:r>
+            <a:endParaRPr lang="en-US" dirty="0"/>
+          </a:p>
+        </p:txBody>
+      </p:sp>
+      <p:sp>
+        <p:nvSpPr>
+          <p:cNvPr id="3" name="Content Placeholder 2"/>
+          <p:cNvSpPr>
+            <a:spLocks noGrp="1"/>
+          </p:cNvSpPr>
+          <p:nvPr>
+            <p:ph idx="1"/>
+          </p:nvPr>
+        </p:nvSpPr>
+        <p:spPr/>
+        <p:txBody>
+          <a:bodyPr/>
+          <a:lstStyle/>
+          <a:p>
+            <a:pPr marL="457200" indent="-457200">
+              <a:buFont typeface="Arial"/>
+              <a:buChar char="•"/>
+            </a:pPr>
+            <a:r>
+              <a:rPr lang="en-US" dirty="0" smtClean="0"/>
+              <a:t>This is where Python really shines!</a:t>
+            </a:r>
+            <a:endParaRPr lang="en-US" dirty="0"/>
+          </a:p>
+        </p:txBody>
+      </p:sp>
+    </p:spTree>
+    <p:extLst>
+      <p:ext uri="{BB962C8B-B14F-4D97-AF65-F5344CB8AC3E}">
+        <p14:creationId xmlns:p14="http://schemas.microsoft.com/office/powerpoint/2010/main" val="115079408"/>
+      </p:ext>
+    </p:extLst>
+  </p:cSld>
+  <p:clrMapOvr>
+    <a:masterClrMapping/>
+  </p:clrMapOvr>
+  <p:timing>
+    <p:tnLst>
+      <p:par>
+        <p:cTn xmlns:p14="http://schemas.microsoft.com/office/powerpoint/2010/main" id="1" dur="indefinite" restart="never" nodeType="tmRoot"/>
+      </p:par>
+    </p:tnLst>
+  </p:timing>
+</p:sld>
+</file>
+
+<file path=ppt/slides/slide20.xml><?xml version="1.0" encoding="utf-8"?>
+<p:sld xmlns:a="http://schemas.openxmlformats.org/drawingml/2006/main" xmlns:r="http://schemas.openxmlformats.org/officeDocument/2006/relationships" xmlns:p="http://schemas.openxmlformats.org/presentationml/2006/main">
+  <p:cSld>
+    <p:spTree>
+      <p:nvGrpSpPr>
+        <p:cNvPr id="1" name=""/>
+        <p:cNvGrpSpPr/>
+        <p:nvPr/>
+      </p:nvGrpSpPr>
+      <p:grpSpPr>
+        <a:xfrm>
+          <a:off x="0" y="0"/>
+          <a:ext cx="0" cy="0"/>
+          <a:chOff x="0" y="0"/>
+          <a:chExt cx="0" cy="0"/>
+        </a:xfrm>
+      </p:grpSpPr>
+      <p:sp>
+        <p:nvSpPr>
+          <p:cNvPr id="2" name="Title 1"/>
+          <p:cNvSpPr>
+            <a:spLocks noGrp="1"/>
+          </p:cNvSpPr>
+          <p:nvPr>
+            <p:ph type="title"/>
+          </p:nvPr>
+        </p:nvSpPr>
         <p:spPr/>
         <p:txBody>
           <a:bodyPr/>
@@ -6060,7 +6754,7 @@
 </p:sld>
 </file>
 
-<file path=ppt/slides/slide19.xml><?xml version="1.0" encoding="utf-8"?>
+<file path=ppt/slides/slide21.xml><?xml version="1.0" encoding="utf-8"?>
 <p:sld xmlns:a="http://schemas.openxmlformats.org/drawingml/2006/main" xmlns:r="http://schemas.openxmlformats.org/officeDocument/2006/relationships" xmlns:p="http://schemas.openxmlformats.org/presentationml/2006/main">
   <p:cSld>
     <p:spTree>
@@ -6426,7 +7120,7 @@
 </p:sld>
 </file>
 
-<file path=ppt/slides/slide2.xml><?xml version="1.0" encoding="utf-8"?>
+<file path=ppt/slides/slide22.xml><?xml version="1.0" encoding="utf-8"?>
 <p:sld xmlns:a="http://schemas.openxmlformats.org/drawingml/2006/main" xmlns:r="http://schemas.openxmlformats.org/officeDocument/2006/relationships" xmlns:p="http://schemas.openxmlformats.org/presentationml/2006/main">
   <p:cSld>
     <p:spTree>
@@ -6460,7 +7154,7 @@
           <a:p>
             <a:r>
               <a:rPr lang="en-US" dirty="0" smtClean="0"/>
-              <a:t>reading and writing files in python</a:t>
+              <a:t>writing custom functions</a:t>
             </a:r>
             <a:endParaRPr lang="en-US" dirty="0"/>
           </a:p>
@@ -6487,16 +7181,156 @@
             </a:pPr>
             <a:r>
               <a:rPr lang="en-US" dirty="0" smtClean="0"/>
-              <a:t>This is where Python really shines!</a:t>
-            </a:r>
+              <a:t>Reference example:</a:t>
+            </a:r>
+          </a:p>
+          <a:p>
+            <a:pPr marL="457200" indent="-457200">
+              <a:buFont typeface="Arial"/>
+              <a:buChar char="•"/>
+            </a:pPr>
             <a:endParaRPr lang="en-US" dirty="0"/>
+          </a:p>
+          <a:p>
+            <a:pPr marL="457200" indent="-457200">
+              <a:buFont typeface="Arial"/>
+              <a:buChar char="•"/>
+            </a:pPr>
+            <a:endParaRPr lang="en-US" dirty="0" smtClean="0"/>
+          </a:p>
+          <a:p>
+            <a:endParaRPr lang="en-US" sz="2000" dirty="0"/>
+          </a:p>
+        </p:txBody>
+      </p:sp>
+      <p:sp>
+        <p:nvSpPr>
+          <p:cNvPr id="4" name="TextBox 3"/>
+          <p:cNvSpPr txBox="1"/>
+          <p:nvPr/>
+        </p:nvSpPr>
+        <p:spPr>
+          <a:xfrm>
+            <a:off x="1035539" y="2414085"/>
+            <a:ext cx="5109893" cy="1631216"/>
+          </a:xfrm>
+          <a:prstGeom prst="rect">
+            <a:avLst/>
+          </a:prstGeom>
+          <a:noFill/>
+        </p:spPr>
+        <p:txBody>
+          <a:bodyPr wrap="none" rtlCol="0">
+            <a:spAutoFit/>
+          </a:bodyPr>
+          <a:lstStyle/>
+          <a:p>
+            <a:r>
+              <a:rPr lang="en-US" sz="2000" dirty="0">
+                <a:latin typeface="Monaco"/>
+                <a:cs typeface="Monaco"/>
+              </a:rPr>
+              <a:t>my_list = [1, 2, 3, 4, 5, 6</a:t>
+            </a:r>
+            <a:r>
+              <a:rPr lang="en-US" sz="2000" dirty="0" smtClean="0">
+                <a:latin typeface="Monaco"/>
+                <a:cs typeface="Monaco"/>
+              </a:rPr>
+              <a:t>]</a:t>
+            </a:r>
+          </a:p>
+          <a:p>
+            <a:endParaRPr lang="en-US" sz="2000" dirty="0">
+              <a:latin typeface="Monaco"/>
+              <a:cs typeface="Monaco"/>
+            </a:endParaRPr>
+          </a:p>
+          <a:p>
+            <a:r>
+              <a:rPr lang="en-US" sz="2000" dirty="0">
+                <a:solidFill>
+                  <a:schemeClr val="accent3"/>
+                </a:solidFill>
+                <a:latin typeface="Monaco"/>
+                <a:cs typeface="Monaco"/>
+              </a:rPr>
+              <a:t>a</a:t>
+            </a:r>
+            <a:r>
+              <a:rPr lang="en-US" sz="2000" dirty="0">
+                <a:latin typeface="Monaco"/>
+                <a:cs typeface="Monaco"/>
+              </a:rPr>
+              <a:t> = </a:t>
+            </a:r>
+            <a:r>
+              <a:rPr lang="en-US" sz="2000" dirty="0" smtClean="0">
+                <a:solidFill>
+                  <a:schemeClr val="accent5"/>
+                </a:solidFill>
+                <a:latin typeface="Monaco"/>
+                <a:cs typeface="Monaco"/>
+              </a:rPr>
+              <a:t>len</a:t>
+            </a:r>
+            <a:r>
+              <a:rPr lang="en-US" sz="2000" dirty="0" smtClean="0">
+                <a:latin typeface="Monaco"/>
+                <a:cs typeface="Monaco"/>
+              </a:rPr>
+              <a:t>(</a:t>
+            </a:r>
+            <a:r>
+              <a:rPr lang="en-US" sz="2000" dirty="0">
+                <a:solidFill>
+                  <a:schemeClr val="accent6"/>
+                </a:solidFill>
+                <a:latin typeface="Monaco"/>
+                <a:cs typeface="Monaco"/>
+              </a:rPr>
+              <a:t>my_list</a:t>
+            </a:r>
+            <a:r>
+              <a:rPr lang="en-US" sz="2000" dirty="0">
+                <a:latin typeface="Monaco"/>
+                <a:cs typeface="Monaco"/>
+              </a:rPr>
+              <a:t>)  </a:t>
+            </a:r>
+            <a:r>
+              <a:rPr lang="en-US" sz="2000" dirty="0" smtClean="0">
+                <a:latin typeface="Monaco"/>
+                <a:cs typeface="Monaco"/>
+              </a:rPr>
+              <a:t> # </a:t>
+            </a:r>
+            <a:r>
+              <a:rPr lang="en-US" sz="2000" dirty="0">
+                <a:latin typeface="Monaco"/>
+                <a:cs typeface="Monaco"/>
+              </a:rPr>
+              <a:t>here, a = 6</a:t>
+            </a:r>
+          </a:p>
+          <a:p>
+            <a:r>
+              <a:rPr lang="en-US" sz="2000" dirty="0">
+                <a:latin typeface="Monaco"/>
+                <a:cs typeface="Monaco"/>
+              </a:rPr>
+              <a:t> </a:t>
+            </a:r>
+          </a:p>
+          <a:p>
+            <a:endParaRPr lang="en-US" sz="2000" dirty="0"/>
           </a:p>
         </p:txBody>
       </p:sp>
     </p:spTree>
     <p:extLst>
       <p:ext uri="{BB962C8B-B14F-4D97-AF65-F5344CB8AC3E}">
-        <p14:creationId xmlns:p14="http://schemas.microsoft.com/office/powerpoint/2010/main" val="115079408"/>
+        <p14:creationId xmlns:p14="http://schemas.microsoft.com/office/powerpoint/2010/main" val="954817440"/>
       </p:ext>
     </p:extLst>
   </p:cSld>
@@ -6513,7 +7347,7 @@
 </p:sld>
 </file>
 
-<file path=ppt/slides/slide20.xml><?xml version="1.0" encoding="utf-8"?>
+<file path=ppt/slides/slide23.xml><?xml version="1.0" encoding="utf-8"?>
 <p:sld xmlns:a="http://schemas.openxmlformats.org/drawingml/2006/main" xmlns:r="http://schemas.openxmlformats.org/officeDocument/2006/relationships" xmlns:p="http://schemas.openxmlformats.org/presentationml/2006/main">
   <p:cSld>
     <p:spTree>
@@ -6592,7 +7426,68 @@
             <a:endParaRPr lang="en-US" dirty="0" smtClean="0"/>
           </a:p>
           <a:p>
+            <a:pPr marL="457200" indent="-457200">
+              <a:buFont typeface="Arial"/>
+              <a:buChar char="•"/>
+            </a:pPr>
             <a:endParaRPr lang="en-US" sz="2000" dirty="0"/>
+          </a:p>
+          <a:p>
+            <a:pPr lvl="1" indent="0">
+              <a:buNone/>
+            </a:pPr>
+            <a:r>
+              <a:rPr lang="en-US" sz="2000" dirty="0" smtClean="0">
+                <a:solidFill>
+                  <a:schemeClr val="accent3"/>
+                </a:solidFill>
+                <a:latin typeface="Monaco"/>
+                <a:cs typeface="Monaco"/>
+              </a:rPr>
+              <a:t>	a</a:t>
+            </a:r>
+            <a:r>
+              <a:rPr lang="en-US" sz="2000" dirty="0" smtClean="0"/>
+              <a:t>: the returned value</a:t>
+            </a:r>
+          </a:p>
+          <a:p>
+            <a:pPr lvl="1" indent="0">
+              <a:buNone/>
+            </a:pPr>
+            <a:r>
+              <a:rPr lang="en-US" sz="2000" dirty="0" smtClean="0">
+                <a:solidFill>
+                  <a:schemeClr val="accent5"/>
+                </a:solidFill>
+                <a:latin typeface="Monaco"/>
+                <a:cs typeface="Monaco"/>
+              </a:rPr>
+              <a:t>	len</a:t>
+            </a:r>
+            <a:r>
+              <a:rPr lang="en-US" sz="2000" dirty="0" smtClean="0"/>
+              <a:t>: the function name</a:t>
+            </a:r>
+          </a:p>
+          <a:p>
+            <a:pPr lvl="1" indent="0">
+              <a:buNone/>
+            </a:pPr>
+            <a:r>
+              <a:rPr lang="en-US" sz="2000" dirty="0" smtClean="0">
+                <a:solidFill>
+                  <a:srgbClr val="B4B392"/>
+                </a:solidFill>
+                <a:latin typeface="Monaco"/>
+                <a:cs typeface="Monaco"/>
+              </a:rPr>
+              <a:t>	my_list</a:t>
+            </a:r>
+            <a:r>
+              <a:rPr lang="en-US" sz="2000" dirty="0" smtClean="0"/>
+              <a:t>: the argument to the function</a:t>
+            </a:r>
           </a:p>
         </p:txBody>
       </p:sp>
@@ -6723,294 +7618,6 @@
     </p:spTree>
     <p:extLst>
       <p:ext uri="{BB962C8B-B14F-4D97-AF65-F5344CB8AC3E}">
-        <p14:creationId xmlns:p14="http://schemas.microsoft.com/office/powerpoint/2010/main" val="954817440"/>
-      </p:ext>
-    </p:extLst>
-  </p:cSld>
-  <p:clrMapOvr>
-    <a:masterClrMapping/>
-  </p:clrMapOvr>
-  <p:timing>
-    <p:tnLst>
-      <p:par>
-        <p:cTn xmlns:p14="http://schemas.microsoft.com/office/powerpoint/2010/main" id="1" dur="indefinite" restart="never" nodeType="tmRoot"/>
-      </p:par>
-    </p:tnLst>
-  </p:timing>
-</p:sld>
-</file>
-
-<file path=ppt/slides/slide21.xml><?xml version="1.0" encoding="utf-8"?>
-<p:sld xmlns:a="http://schemas.openxmlformats.org/drawingml/2006/main" xmlns:r="http://schemas.openxmlformats.org/officeDocument/2006/relationships" xmlns:p="http://schemas.openxmlformats.org/presentationml/2006/main">
-  <p:cSld>
-    <p:spTree>
-      <p:nvGrpSpPr>
-        <p:cNvPr id="1" name=""/>
-        <p:cNvGrpSpPr/>
-        <p:nvPr/>
-      </p:nvGrpSpPr>
-      <p:grpSpPr>
-        <a:xfrm>
-          <a:off x="0" y="0"/>
-          <a:ext cx="0" cy="0"/>
-          <a:chOff x="0" y="0"/>
-          <a:chExt cx="0" cy="0"/>
-        </a:xfrm>
-      </p:grpSpPr>
-      <p:sp>
-        <p:nvSpPr>
-          <p:cNvPr id="2" name="Title 1"/>
-          <p:cNvSpPr>
-            <a:spLocks noGrp="1"/>
-          </p:cNvSpPr>
-          <p:nvPr>
-            <p:ph type="title"/>
-          </p:nvPr>
-        </p:nvSpPr>
-        <p:spPr/>
-        <p:txBody>
-          <a:bodyPr/>
-          <a:lstStyle/>
-          <a:p>
-            <a:r>
-              <a:rPr lang="en-US" dirty="0" smtClean="0"/>
-              <a:t>writing custom functions</a:t>
-            </a:r>
-            <a:endParaRPr lang="en-US" dirty="0"/>
-          </a:p>
-        </p:txBody>
-      </p:sp>
-      <p:sp>
-        <p:nvSpPr>
-          <p:cNvPr id="3" name="Content Placeholder 2"/>
-          <p:cNvSpPr>
-            <a:spLocks noGrp="1"/>
-          </p:cNvSpPr>
-          <p:nvPr>
-            <p:ph idx="1"/>
-          </p:nvPr>
-        </p:nvSpPr>
-        <p:spPr/>
-        <p:txBody>
-          <a:bodyPr/>
-          <a:lstStyle/>
-          <a:p>
-            <a:pPr marL="457200" indent="-457200">
-              <a:buFont typeface="Arial"/>
-              <a:buChar char="•"/>
-            </a:pPr>
-            <a:r>
-              <a:rPr lang="en-US" dirty="0" smtClean="0"/>
-              <a:t>Reference example:</a:t>
-            </a:r>
-          </a:p>
-          <a:p>
-            <a:pPr marL="457200" indent="-457200">
-              <a:buFont typeface="Arial"/>
-              <a:buChar char="•"/>
-            </a:pPr>
-            <a:endParaRPr lang="en-US" dirty="0"/>
-          </a:p>
-          <a:p>
-            <a:pPr marL="457200" indent="-457200">
-              <a:buFont typeface="Arial"/>
-              <a:buChar char="•"/>
-            </a:pPr>
-            <a:endParaRPr lang="en-US" dirty="0" smtClean="0"/>
-          </a:p>
-          <a:p>
-            <a:pPr marL="457200" indent="-457200">
-              <a:buFont typeface="Arial"/>
-              <a:buChar char="•"/>
-            </a:pPr>
-            <a:endParaRPr lang="en-US" sz="2000" dirty="0"/>
-          </a:p>
-          <a:p>
-            <a:pPr lvl="1" indent="0">
-              <a:buNone/>
-            </a:pPr>
-            <a:r>
-              <a:rPr lang="en-US" sz="2000" dirty="0" smtClean="0">
-                <a:solidFill>
-                  <a:schemeClr val="accent3"/>
-                </a:solidFill>
-                <a:latin typeface="Monaco"/>
-                <a:cs typeface="Monaco"/>
-              </a:rPr>
-              <a:t>	a</a:t>
-            </a:r>
-            <a:r>
-              <a:rPr lang="en-US" sz="2000" dirty="0" smtClean="0"/>
-              <a:t>: the returned value</a:t>
-            </a:r>
-          </a:p>
-          <a:p>
-            <a:pPr lvl="1" indent="0">
-              <a:buNone/>
-            </a:pPr>
-            <a:r>
-              <a:rPr lang="en-US" sz="2000" dirty="0" smtClean="0">
-                <a:solidFill>
-                  <a:schemeClr val="accent5"/>
-                </a:solidFill>
-                <a:latin typeface="Monaco"/>
-                <a:cs typeface="Monaco"/>
-              </a:rPr>
-              <a:t>	len</a:t>
-            </a:r>
-            <a:r>
-              <a:rPr lang="en-US" sz="2000" dirty="0" smtClean="0"/>
-              <a:t>: the function name</a:t>
-            </a:r>
-          </a:p>
-          <a:p>
-            <a:pPr lvl="1" indent="0">
-              <a:buNone/>
-            </a:pPr>
-            <a:r>
-              <a:rPr lang="en-US" sz="2000" dirty="0" smtClean="0">
-                <a:solidFill>
-                  <a:srgbClr val="B4B392"/>
-                </a:solidFill>
-                <a:latin typeface="Monaco"/>
-                <a:cs typeface="Monaco"/>
-              </a:rPr>
-              <a:t>	my_list</a:t>
-            </a:r>
-            <a:r>
-              <a:rPr lang="en-US" sz="2000" dirty="0" smtClean="0"/>
-              <a:t>: the argument to the function</a:t>
-            </a:r>
-          </a:p>
-        </p:txBody>
-      </p:sp>
-      <p:sp>
-        <p:nvSpPr>
-          <p:cNvPr id="4" name="TextBox 3"/>
-          <p:cNvSpPr txBox="1"/>
-          <p:nvPr/>
-        </p:nvSpPr>
-        <p:spPr>
-          <a:xfrm>
-            <a:off x="1035539" y="2414085"/>
-            <a:ext cx="5109893" cy="1631216"/>
-          </a:xfrm>
-          <a:prstGeom prst="rect">
-            <a:avLst/>
-          </a:prstGeom>
-          <a:noFill/>
-        </p:spPr>
-        <p:txBody>
-          <a:bodyPr wrap="none" rtlCol="0">
-            <a:spAutoFit/>
-          </a:bodyPr>
-          <a:lstStyle/>
-          <a:p>
-            <a:r>
-              <a:rPr lang="en-US" sz="2000" dirty="0">
-                <a:latin typeface="Monaco"/>
-                <a:cs typeface="Monaco"/>
-              </a:rPr>
-              <a:t>my_list = [1, 2, 3, 4, 5, 6</a:t>
-            </a:r>
-            <a:r>
-              <a:rPr lang="en-US" sz="2000" dirty="0" smtClean="0">
-                <a:latin typeface="Monaco"/>
-                <a:cs typeface="Monaco"/>
-              </a:rPr>
-              <a:t>]</a:t>
-            </a:r>
-          </a:p>
-          <a:p>
-            <a:endParaRPr lang="en-US" sz="2000" dirty="0">
-              <a:latin typeface="Monaco"/>
-              <a:cs typeface="Monaco"/>
-            </a:endParaRPr>
-          </a:p>
-          <a:p>
-            <a:r>
-              <a:rPr lang="en-US" sz="2000" dirty="0">
-                <a:solidFill>
-                  <a:schemeClr val="accent3"/>
-                </a:solidFill>
-                <a:latin typeface="Monaco"/>
-                <a:cs typeface="Monaco"/>
-              </a:rPr>
-              <a:t>a</a:t>
-            </a:r>
-            <a:r>
-              <a:rPr lang="en-US" sz="2000" dirty="0">
-                <a:latin typeface="Monaco"/>
-                <a:cs typeface="Monaco"/>
-              </a:rPr>
-              <a:t> = </a:t>
-            </a:r>
-            <a:r>
-              <a:rPr lang="en-US" sz="2000" dirty="0" smtClean="0">
-                <a:solidFill>
-                  <a:schemeClr val="accent5"/>
-                </a:solidFill>
-                <a:latin typeface="Monaco"/>
-                <a:cs typeface="Monaco"/>
-              </a:rPr>
-              <a:t>len</a:t>
-            </a:r>
-            <a:r>
-              <a:rPr lang="en-US" sz="2000" dirty="0" smtClean="0">
-                <a:latin typeface="Monaco"/>
-                <a:cs typeface="Monaco"/>
-              </a:rPr>
-              <a:t>(</a:t>
-            </a:r>
-            <a:r>
-              <a:rPr lang="en-US" sz="2000" dirty="0">
-                <a:solidFill>
-                  <a:schemeClr val="accent6"/>
-                </a:solidFill>
-                <a:latin typeface="Monaco"/>
-                <a:cs typeface="Monaco"/>
-              </a:rPr>
-              <a:t>my_list</a:t>
-            </a:r>
-            <a:r>
-              <a:rPr lang="en-US" sz="2000" dirty="0">
-                <a:latin typeface="Monaco"/>
-                <a:cs typeface="Monaco"/>
-              </a:rPr>
-              <a:t>)  </a:t>
-            </a:r>
-            <a:r>
-              <a:rPr lang="en-US" sz="2000" dirty="0" smtClean="0">
-                <a:latin typeface="Monaco"/>
-                <a:cs typeface="Monaco"/>
-              </a:rPr>
-              <a:t> # </a:t>
-            </a:r>
-            <a:r>
-              <a:rPr lang="en-US" sz="2000" dirty="0">
-                <a:latin typeface="Monaco"/>
-                <a:cs typeface="Monaco"/>
-              </a:rPr>
-              <a:t>here, a = 6</a:t>
-            </a:r>
-          </a:p>
-          <a:p>
-            <a:r>
-              <a:rPr lang="en-US" sz="2000" dirty="0">
-                <a:latin typeface="Monaco"/>
-                <a:cs typeface="Monaco"/>
-              </a:rPr>
-              <a:t> </a:t>
-            </a:r>
-          </a:p>
-          <a:p>
-            <a:endParaRPr lang="en-US" sz="2000" dirty="0"/>
-          </a:p>
-        </p:txBody>
-      </p:sp>
-    </p:spTree>
-    <p:extLst>
-      <p:ext uri="{BB962C8B-B14F-4D97-AF65-F5344CB8AC3E}">
         <p14:creationId xmlns:p14="http://schemas.microsoft.com/office/powerpoint/2010/main" val="1416297128"/>
       </p:ext>
     </p:extLst>
@@ -7028,7 +7635,7 @@
 </p:sld>
 </file>
 
-<file path=ppt/slides/slide22.xml><?xml version="1.0" encoding="utf-8"?>
+<file path=ppt/slides/slide24.xml><?xml version="1.0" encoding="utf-8"?>
 <p:sld xmlns:a="http://schemas.openxmlformats.org/drawingml/2006/main" xmlns:r="http://schemas.openxmlformats.org/officeDocument/2006/relationships" xmlns:p="http://schemas.openxmlformats.org/presentationml/2006/main">
   <p:cSld>
     <p:spTree>
@@ -7364,7 +7971,7 @@
 </p:sld>
 </file>
 
-<file path=ppt/slides/slide23.xml><?xml version="1.0" encoding="utf-8"?>
+<file path=ppt/slides/slide25.xml><?xml version="1.0" encoding="utf-8"?>
 <p:sld xmlns:a="http://schemas.openxmlformats.org/drawingml/2006/main" xmlns:r="http://schemas.openxmlformats.org/officeDocument/2006/relationships" xmlns:p="http://schemas.openxmlformats.org/presentationml/2006/main">
   <p:cSld>
     <p:spTree>
@@ -7962,7 +8569,7 @@
 </p:sld>
 </file>
 
-<file path=ppt/slides/slide24.xml><?xml version="1.0" encoding="utf-8"?>
+<file path=ppt/slides/slide26.xml><?xml version="1.0" encoding="utf-8"?>
 <p:sld xmlns:a="http://schemas.openxmlformats.org/drawingml/2006/main" xmlns:r="http://schemas.openxmlformats.org/officeDocument/2006/relationships" xmlns:p="http://schemas.openxmlformats.org/presentationml/2006/main">
   <p:cSld>
     <p:spTree>
@@ -9140,7 +9747,7 @@
 </p:sld>
 </file>
 
-<file path=ppt/slides/slide25.xml><?xml version="1.0" encoding="utf-8"?>
+<file path=ppt/slides/slide27.xml><?xml version="1.0" encoding="utf-8"?>
 <p:sld xmlns:a="http://schemas.openxmlformats.org/drawingml/2006/main" xmlns:r="http://schemas.openxmlformats.org/officeDocument/2006/relationships" xmlns:p="http://schemas.openxmlformats.org/presentationml/2006/main">
   <p:cSld>
     <p:spTree>
@@ -9808,319 +10415,6 @@
 </p:sld>
 </file>
 
-<file path=ppt/slides/slide26.xml><?xml version="1.0" encoding="utf-8"?>
-<p:sld xmlns:a="http://schemas.openxmlformats.org/drawingml/2006/main" xmlns:r="http://schemas.openxmlformats.org/officeDocument/2006/relationships" xmlns:p="http://schemas.openxmlformats.org/presentationml/2006/main">
-  <p:cSld>
-    <p:spTree>
-      <p:nvGrpSpPr>
-        <p:cNvPr id="1" name=""/>
-        <p:cNvGrpSpPr/>
-        <p:nvPr/>
-      </p:nvGrpSpPr>
-      <p:grpSpPr>
-        <a:xfrm>
-          <a:off x="0" y="0"/>
-          <a:ext cx="0" cy="0"/>
-          <a:chOff x="0" y="0"/>
-          <a:chExt cx="0" cy="0"/>
-        </a:xfrm>
-      </p:grpSpPr>
-      <p:sp>
-        <p:nvSpPr>
-          <p:cNvPr id="2" name="Title 1"/>
-          <p:cNvSpPr>
-            <a:spLocks noGrp="1"/>
-          </p:cNvSpPr>
-          <p:nvPr>
-            <p:ph type="title"/>
-          </p:nvPr>
-        </p:nvSpPr>
-        <p:spPr/>
-        <p:txBody>
-          <a:bodyPr/>
-          <a:lstStyle/>
-          <a:p>
-            <a:r>
-              <a:rPr lang="en-US" dirty="0" smtClean="0"/>
-              <a:t>use test cases to ensure your function works</a:t>
-            </a:r>
-            <a:endParaRPr lang="en-US" dirty="0"/>
-          </a:p>
-        </p:txBody>
-      </p:sp>
-      <p:sp>
-        <p:nvSpPr>
-          <p:cNvPr id="3" name="Content Placeholder 2"/>
-          <p:cNvSpPr>
-            <a:spLocks noGrp="1"/>
-          </p:cNvSpPr>
-          <p:nvPr>
-            <p:ph idx="1"/>
-          </p:nvPr>
-        </p:nvSpPr>
-        <p:spPr/>
-        <p:txBody>
-          <a:bodyPr/>
-          <a:lstStyle/>
-          <a:p>
-            <a:pPr marL="457200" indent="-457200">
-              <a:buFont typeface="Arial"/>
-              <a:buChar char="•"/>
-            </a:pPr>
-            <a:r>
-              <a:rPr lang="en-US" dirty="0" smtClean="0"/>
-              <a:t>After writing a function, *always* test it with input that you know should work</a:t>
-            </a:r>
-          </a:p>
-        </p:txBody>
-      </p:sp>
-    </p:spTree>
-    <p:extLst>
-      <p:ext uri="{BB962C8B-B14F-4D97-AF65-F5344CB8AC3E}">
-        <p14:creationId xmlns:p14="http://schemas.microsoft.com/office/powerpoint/2010/main" val="2262734904"/>
-      </p:ext>
-    </p:extLst>
-  </p:cSld>
-  <p:clrMapOvr>
-    <a:masterClrMapping/>
-  </p:clrMapOvr>
-  <p:timing>
-    <p:tnLst>
-      <p:par>
-        <p:cTn xmlns:p14="http://schemas.microsoft.com/office/powerpoint/2010/main" id="1" dur="indefinite" restart="never" nodeType="tmRoot"/>
-      </p:par>
-    </p:tnLst>
-  </p:timing>
-</p:sld>
-</file>
-
-<file path=ppt/slides/slide27.xml><?xml version="1.0" encoding="utf-8"?>
-<p:sld xmlns:a="http://schemas.openxmlformats.org/drawingml/2006/main" xmlns:r="http://schemas.openxmlformats.org/officeDocument/2006/relationships" xmlns:p="http://schemas.openxmlformats.org/presentationml/2006/main">
-  <p:cSld>
-    <p:spTree>
-      <p:nvGrpSpPr>
-        <p:cNvPr id="1" name=""/>
-        <p:cNvGrpSpPr/>
-        <p:nvPr/>
-      </p:nvGrpSpPr>
-      <p:grpSpPr>
-        <a:xfrm>
-          <a:off x="0" y="0"/>
-          <a:ext cx="0" cy="0"/>
-          <a:chOff x="0" y="0"/>
-          <a:chExt cx="0" cy="0"/>
-        </a:xfrm>
-      </p:grpSpPr>
-      <p:sp>
-        <p:nvSpPr>
-          <p:cNvPr id="2" name="Title 1"/>
-          <p:cNvSpPr>
-            <a:spLocks noGrp="1"/>
-          </p:cNvSpPr>
-          <p:nvPr>
-            <p:ph type="title"/>
-          </p:nvPr>
-        </p:nvSpPr>
-        <p:spPr/>
-        <p:txBody>
-          <a:bodyPr/>
-          <a:lstStyle/>
-          <a:p>
-            <a:r>
-              <a:rPr lang="en-US" dirty="0" smtClean="0"/>
-              <a:t>use test cases to ensure your function works</a:t>
-            </a:r>
-            <a:endParaRPr lang="en-US" dirty="0"/>
-          </a:p>
-        </p:txBody>
-      </p:sp>
-      <p:sp>
-        <p:nvSpPr>
-          <p:cNvPr id="3" name="Content Placeholder 2"/>
-          <p:cNvSpPr>
-            <a:spLocks noGrp="1"/>
-          </p:cNvSpPr>
-          <p:nvPr>
-            <p:ph idx="1"/>
-          </p:nvPr>
-        </p:nvSpPr>
-        <p:spPr/>
-        <p:txBody>
-          <a:bodyPr/>
-          <a:lstStyle/>
-          <a:p>
-            <a:pPr marL="457200" indent="-457200">
-              <a:buFont typeface="Arial"/>
-              <a:buChar char="•"/>
-            </a:pPr>
-            <a:r>
-              <a:rPr lang="en-US" dirty="0" smtClean="0"/>
-              <a:t>After writing a function, *always* test it with input that you know should work</a:t>
-            </a:r>
-          </a:p>
-        </p:txBody>
-      </p:sp>
-      <p:sp>
-        <p:nvSpPr>
-          <p:cNvPr id="4" name="TextBox 3"/>
-          <p:cNvSpPr txBox="1"/>
-          <p:nvPr/>
-        </p:nvSpPr>
-        <p:spPr>
-          <a:xfrm>
-            <a:off x="457200" y="3376602"/>
-            <a:ext cx="8338444" cy="3139321"/>
-          </a:xfrm>
-          <a:prstGeom prst="rect">
-            <a:avLst/>
-          </a:prstGeom>
-          <a:noFill/>
-        </p:spPr>
-        <p:txBody>
-          <a:bodyPr wrap="square" rtlCol="0">
-            <a:spAutoFit/>
-          </a:bodyPr>
-          <a:lstStyle/>
-          <a:p>
-            <a:endParaRPr lang="en-US" dirty="0">
-              <a:solidFill>
-                <a:schemeClr val="bg1">
-                  <a:lumMod val="65000"/>
-                </a:schemeClr>
-              </a:solidFill>
-              <a:latin typeface="Monaco"/>
-              <a:cs typeface="Monaco"/>
-            </a:endParaRPr>
-          </a:p>
-          <a:p>
-            <a:r>
-              <a:rPr lang="en-US" dirty="0" smtClean="0">
-                <a:latin typeface="Monaco"/>
-                <a:cs typeface="Monaco"/>
-              </a:rPr>
-              <a:t>def triangle_area(l, w):</a:t>
-            </a:r>
-          </a:p>
-          <a:p>
-            <a:r>
-              <a:rPr lang="en-US" dirty="0">
-                <a:latin typeface="Monaco"/>
-                <a:cs typeface="Monaco"/>
-              </a:rPr>
-              <a:t>	</a:t>
-            </a:r>
-            <a:r>
-              <a:rPr lang="en-US" dirty="0" smtClean="0">
-                <a:latin typeface="Monaco"/>
-                <a:cs typeface="Monaco"/>
-              </a:rPr>
-              <a:t>area = l*w/ 2.0</a:t>
-            </a:r>
-          </a:p>
-          <a:p>
-            <a:r>
-              <a:rPr lang="en-US" dirty="0">
-                <a:latin typeface="Monaco"/>
-                <a:cs typeface="Monaco"/>
-              </a:rPr>
-              <a:t>	</a:t>
-            </a:r>
-            <a:r>
-              <a:rPr lang="en-US" dirty="0" smtClean="0">
-                <a:latin typeface="Monaco"/>
-                <a:cs typeface="Monaco"/>
-              </a:rPr>
-              <a:t>return area</a:t>
-            </a:r>
-          </a:p>
-          <a:p>
-            <a:endParaRPr lang="en-US" dirty="0">
-              <a:latin typeface="Monaco"/>
-              <a:cs typeface="Monaco"/>
-            </a:endParaRPr>
-          </a:p>
-          <a:p>
-            <a:r>
-              <a:rPr lang="en-US" dirty="0" smtClean="0">
-                <a:latin typeface="Monaco"/>
-                <a:cs typeface="Monaco"/>
-              </a:rPr>
-              <a:t># Before using the function all over the place, make sure 	that l=7, w=6 prints 21</a:t>
-            </a:r>
-          </a:p>
-          <a:p>
-            <a:endParaRPr lang="en-US" dirty="0" smtClean="0">
-              <a:latin typeface="Monaco"/>
-              <a:cs typeface="Monaco"/>
-            </a:endParaRPr>
-          </a:p>
-          <a:p>
-            <a:r>
-              <a:rPr lang="en-US" dirty="0" smtClean="0">
-                <a:latin typeface="Monaco"/>
-                <a:cs typeface="Monaco"/>
-              </a:rPr>
-              <a:t>print(triangle_area(7,6))</a:t>
-            </a:r>
-          </a:p>
-          <a:p>
-            <a:r>
-              <a:rPr lang="en-US" dirty="0">
-                <a:latin typeface="Monaco"/>
-                <a:cs typeface="Monaco"/>
-              </a:rPr>
-              <a:t>	</a:t>
-            </a:r>
-            <a:r>
-              <a:rPr lang="en-US" dirty="0" smtClean="0">
-                <a:solidFill>
-                  <a:schemeClr val="bg1">
-                    <a:lumMod val="65000"/>
-                  </a:schemeClr>
-                </a:solidFill>
-                <a:latin typeface="Monaco"/>
-                <a:cs typeface="Monaco"/>
-              </a:rPr>
-              <a:t>21</a:t>
-            </a:r>
-            <a:endParaRPr lang="en-US" dirty="0">
-              <a:solidFill>
-                <a:schemeClr val="bg1">
-                  <a:lumMod val="65000"/>
-                </a:schemeClr>
-              </a:solidFill>
-              <a:latin typeface="Monaco"/>
-              <a:cs typeface="Monaco"/>
-            </a:endParaRPr>
-          </a:p>
-          <a:p>
-            <a:endParaRPr lang="en-US" dirty="0" smtClean="0">
-              <a:latin typeface="Monaco"/>
-              <a:cs typeface="Monaco"/>
-            </a:endParaRPr>
-          </a:p>
-        </p:txBody>
-      </p:sp>
-    </p:spTree>
-    <p:extLst>
-      <p:ext uri="{BB962C8B-B14F-4D97-AF65-F5344CB8AC3E}">
-        <p14:creationId xmlns:p14="http://schemas.microsoft.com/office/powerpoint/2010/main" val="2174509093"/>
-      </p:ext>
-    </p:extLst>
-  </p:cSld>
-  <p:clrMapOvr>
-    <a:masterClrMapping/>
-  </p:clrMapOvr>
-  <p:timing>
-    <p:tnLst>
-      <p:par>
-        <p:cTn xmlns:p14="http://schemas.microsoft.com/office/powerpoint/2010/main" id="1" dur="indefinite" restart="never" nodeType="tmRoot"/>
-      </p:par>
-    </p:tnLst>
-  </p:timing>
-</p:sld>
-</file>
-
 <file path=ppt/slides/slide28.xml><?xml version="1.0" encoding="utf-8"?>
 <p:sld xmlns:a="http://schemas.openxmlformats.org/drawingml/2006/main" xmlns:r="http://schemas.openxmlformats.org/officeDocument/2006/relationships" xmlns:p="http://schemas.openxmlformats.org/presentationml/2006/main">
   <p:cSld>
@@ -10155,6 +10449,419 @@
           <a:p>
             <a:r>
               <a:rPr lang="en-US" dirty="0" smtClean="0"/>
+              <a:t>use test cases to ensure your function works</a:t>
+            </a:r>
+            <a:endParaRPr lang="en-US" dirty="0"/>
+          </a:p>
+        </p:txBody>
+      </p:sp>
+      <p:sp>
+        <p:nvSpPr>
+          <p:cNvPr id="3" name="Content Placeholder 2"/>
+          <p:cNvSpPr>
+            <a:spLocks noGrp="1"/>
+          </p:cNvSpPr>
+          <p:nvPr>
+            <p:ph idx="1"/>
+          </p:nvPr>
+        </p:nvSpPr>
+        <p:spPr/>
+        <p:txBody>
+          <a:bodyPr/>
+          <a:lstStyle/>
+          <a:p>
+            <a:pPr marL="457200" indent="-457200">
+              <a:buFont typeface="Arial"/>
+              <a:buChar char="•"/>
+            </a:pPr>
+            <a:r>
+              <a:rPr lang="en-US" dirty="0" smtClean="0"/>
+              <a:t>After writing a function, *always* test it with input that you know should work</a:t>
+            </a:r>
+          </a:p>
+        </p:txBody>
+      </p:sp>
+    </p:spTree>
+    <p:extLst>
+      <p:ext uri="{BB962C8B-B14F-4D97-AF65-F5344CB8AC3E}">
+        <p14:creationId xmlns:p14="http://schemas.microsoft.com/office/powerpoint/2010/main" val="2262734904"/>
+      </p:ext>
+    </p:extLst>
+  </p:cSld>
+  <p:clrMapOvr>
+    <a:masterClrMapping/>
+  </p:clrMapOvr>
+  <p:timing>
+    <p:tnLst>
+      <p:par>
+        <p:cTn xmlns:p14="http://schemas.microsoft.com/office/powerpoint/2010/main" id="1" dur="indefinite" restart="never" nodeType="tmRoot"/>
+      </p:par>
+    </p:tnLst>
+  </p:timing>
+</p:sld>
+</file>
+
+<file path=ppt/slides/slide29.xml><?xml version="1.0" encoding="utf-8"?>
+<p:sld xmlns:a="http://schemas.openxmlformats.org/drawingml/2006/main" xmlns:r="http://schemas.openxmlformats.org/officeDocument/2006/relationships" xmlns:p="http://schemas.openxmlformats.org/presentationml/2006/main">
+  <p:cSld>
+    <p:spTree>
+      <p:nvGrpSpPr>
+        <p:cNvPr id="1" name=""/>
+        <p:cNvGrpSpPr/>
+        <p:nvPr/>
+      </p:nvGrpSpPr>
+      <p:grpSpPr>
+        <a:xfrm>
+          <a:off x="0" y="0"/>
+          <a:ext cx="0" cy="0"/>
+          <a:chOff x="0" y="0"/>
+          <a:chExt cx="0" cy="0"/>
+        </a:xfrm>
+      </p:grpSpPr>
+      <p:sp>
+        <p:nvSpPr>
+          <p:cNvPr id="2" name="Title 1"/>
+          <p:cNvSpPr>
+            <a:spLocks noGrp="1"/>
+          </p:cNvSpPr>
+          <p:nvPr>
+            <p:ph type="title"/>
+          </p:nvPr>
+        </p:nvSpPr>
+        <p:spPr/>
+        <p:txBody>
+          <a:bodyPr/>
+          <a:lstStyle/>
+          <a:p>
+            <a:r>
+              <a:rPr lang="en-US" dirty="0" smtClean="0"/>
+              <a:t>use test cases to ensure your function works</a:t>
+            </a:r>
+            <a:endParaRPr lang="en-US" dirty="0"/>
+          </a:p>
+        </p:txBody>
+      </p:sp>
+      <p:sp>
+        <p:nvSpPr>
+          <p:cNvPr id="3" name="Content Placeholder 2"/>
+          <p:cNvSpPr>
+            <a:spLocks noGrp="1"/>
+          </p:cNvSpPr>
+          <p:nvPr>
+            <p:ph idx="1"/>
+          </p:nvPr>
+        </p:nvSpPr>
+        <p:spPr/>
+        <p:txBody>
+          <a:bodyPr/>
+          <a:lstStyle/>
+          <a:p>
+            <a:pPr marL="457200" indent="-457200">
+              <a:buFont typeface="Arial"/>
+              <a:buChar char="•"/>
+            </a:pPr>
+            <a:r>
+              <a:rPr lang="en-US" dirty="0" smtClean="0"/>
+              <a:t>After writing a function, *always* test it with input that you know should work</a:t>
+            </a:r>
+          </a:p>
+        </p:txBody>
+      </p:sp>
+      <p:sp>
+        <p:nvSpPr>
+          <p:cNvPr id="4" name="TextBox 3"/>
+          <p:cNvSpPr txBox="1"/>
+          <p:nvPr/>
+        </p:nvSpPr>
+        <p:spPr>
+          <a:xfrm>
+            <a:off x="457200" y="3376602"/>
+            <a:ext cx="8338444" cy="3139321"/>
+          </a:xfrm>
+          <a:prstGeom prst="rect">
+            <a:avLst/>
+          </a:prstGeom>
+          <a:noFill/>
+        </p:spPr>
+        <p:txBody>
+          <a:bodyPr wrap="square" rtlCol="0">
+            <a:spAutoFit/>
+          </a:bodyPr>
+          <a:lstStyle/>
+          <a:p>
+            <a:endParaRPr lang="en-US" dirty="0">
+              <a:solidFill>
+                <a:schemeClr val="bg1">
+                  <a:lumMod val="65000"/>
+                </a:schemeClr>
+              </a:solidFill>
+              <a:latin typeface="Monaco"/>
+              <a:cs typeface="Monaco"/>
+            </a:endParaRPr>
+          </a:p>
+          <a:p>
+            <a:r>
+              <a:rPr lang="en-US" dirty="0" smtClean="0">
+                <a:latin typeface="Monaco"/>
+                <a:cs typeface="Monaco"/>
+              </a:rPr>
+              <a:t>def triangle_area(l, w):</a:t>
+            </a:r>
+          </a:p>
+          <a:p>
+            <a:r>
+              <a:rPr lang="en-US" dirty="0">
+                <a:latin typeface="Monaco"/>
+                <a:cs typeface="Monaco"/>
+              </a:rPr>
+              <a:t>	</a:t>
+            </a:r>
+            <a:r>
+              <a:rPr lang="en-US" dirty="0" smtClean="0">
+                <a:latin typeface="Monaco"/>
+                <a:cs typeface="Monaco"/>
+              </a:rPr>
+              <a:t>area = l*w/ 2.0</a:t>
+            </a:r>
+          </a:p>
+          <a:p>
+            <a:r>
+              <a:rPr lang="en-US" dirty="0">
+                <a:latin typeface="Monaco"/>
+                <a:cs typeface="Monaco"/>
+              </a:rPr>
+              <a:t>	</a:t>
+            </a:r>
+            <a:r>
+              <a:rPr lang="en-US" dirty="0" smtClean="0">
+                <a:latin typeface="Monaco"/>
+                <a:cs typeface="Monaco"/>
+              </a:rPr>
+              <a:t>return area</a:t>
+            </a:r>
+          </a:p>
+          <a:p>
+            <a:endParaRPr lang="en-US" dirty="0">
+              <a:latin typeface="Monaco"/>
+              <a:cs typeface="Monaco"/>
+            </a:endParaRPr>
+          </a:p>
+          <a:p>
+            <a:r>
+              <a:rPr lang="en-US" dirty="0" smtClean="0">
+                <a:latin typeface="Monaco"/>
+                <a:cs typeface="Monaco"/>
+              </a:rPr>
+              <a:t># Before using the function all over the place, make sure 	that l=7, w=6 prints 21</a:t>
+            </a:r>
+          </a:p>
+          <a:p>
+            <a:endParaRPr lang="en-US" dirty="0" smtClean="0">
+              <a:latin typeface="Monaco"/>
+              <a:cs typeface="Monaco"/>
+            </a:endParaRPr>
+          </a:p>
+          <a:p>
+            <a:r>
+              <a:rPr lang="en-US" dirty="0" smtClean="0">
+                <a:latin typeface="Monaco"/>
+                <a:cs typeface="Monaco"/>
+              </a:rPr>
+              <a:t>print(triangle_area(7,6))</a:t>
+            </a:r>
+          </a:p>
+          <a:p>
+            <a:r>
+              <a:rPr lang="en-US" dirty="0">
+                <a:latin typeface="Monaco"/>
+                <a:cs typeface="Monaco"/>
+              </a:rPr>
+              <a:t>	</a:t>
+            </a:r>
+            <a:r>
+              <a:rPr lang="en-US" dirty="0" smtClean="0">
+                <a:solidFill>
+                  <a:schemeClr val="bg1">
+                    <a:lumMod val="65000"/>
+                  </a:schemeClr>
+                </a:solidFill>
+                <a:latin typeface="Monaco"/>
+                <a:cs typeface="Monaco"/>
+              </a:rPr>
+              <a:t>21</a:t>
+            </a:r>
+            <a:endParaRPr lang="en-US" dirty="0">
+              <a:solidFill>
+                <a:schemeClr val="bg1">
+                  <a:lumMod val="65000"/>
+                </a:schemeClr>
+              </a:solidFill>
+              <a:latin typeface="Monaco"/>
+              <a:cs typeface="Monaco"/>
+            </a:endParaRPr>
+          </a:p>
+          <a:p>
+            <a:endParaRPr lang="en-US" dirty="0" smtClean="0">
+              <a:latin typeface="Monaco"/>
+              <a:cs typeface="Monaco"/>
+            </a:endParaRPr>
+          </a:p>
+        </p:txBody>
+      </p:sp>
+    </p:spTree>
+    <p:extLst>
+      <p:ext uri="{BB962C8B-B14F-4D97-AF65-F5344CB8AC3E}">
+        <p14:creationId xmlns:p14="http://schemas.microsoft.com/office/powerpoint/2010/main" val="2174509093"/>
+      </p:ext>
+    </p:extLst>
+  </p:cSld>
+  <p:clrMapOvr>
+    <a:masterClrMapping/>
+  </p:clrMapOvr>
+  <p:timing>
+    <p:tnLst>
+      <p:par>
+        <p:cTn xmlns:p14="http://schemas.microsoft.com/office/powerpoint/2010/main" id="1" dur="indefinite" restart="never" nodeType="tmRoot"/>
+      </p:par>
+    </p:tnLst>
+  </p:timing>
+</p:sld>
+</file>
+
+<file path=ppt/slides/slide3.xml><?xml version="1.0" encoding="utf-8"?>
+<p:sld xmlns:a="http://schemas.openxmlformats.org/drawingml/2006/main" xmlns:r="http://schemas.openxmlformats.org/officeDocument/2006/relationships" xmlns:p="http://schemas.openxmlformats.org/presentationml/2006/main">
+  <p:cSld>
+    <p:spTree>
+      <p:nvGrpSpPr>
+        <p:cNvPr id="1" name=""/>
+        <p:cNvGrpSpPr/>
+        <p:nvPr/>
+      </p:nvGrpSpPr>
+      <p:grpSpPr>
+        <a:xfrm>
+          <a:off x="0" y="0"/>
+          <a:ext cx="0" cy="0"/>
+          <a:chOff x="0" y="0"/>
+          <a:chExt cx="0" cy="0"/>
+        </a:xfrm>
+      </p:grpSpPr>
+      <p:sp>
+        <p:nvSpPr>
+          <p:cNvPr id="2" name="Title 1"/>
+          <p:cNvSpPr>
+            <a:spLocks noGrp="1"/>
+          </p:cNvSpPr>
+          <p:nvPr>
+            <p:ph type="title"/>
+          </p:nvPr>
+        </p:nvSpPr>
+        <p:spPr/>
+        <p:txBody>
+          <a:bodyPr/>
+          <a:lstStyle/>
+          <a:p>
+            <a:r>
+              <a:rPr lang="en-US" dirty="0" smtClean="0"/>
+              <a:t>reading and writing files in python</a:t>
+            </a:r>
+            <a:endParaRPr lang="en-US" dirty="0"/>
+          </a:p>
+        </p:txBody>
+      </p:sp>
+      <p:sp>
+        <p:nvSpPr>
+          <p:cNvPr id="3" name="Content Placeholder 2"/>
+          <p:cNvSpPr>
+            <a:spLocks noGrp="1"/>
+          </p:cNvSpPr>
+          <p:nvPr>
+            <p:ph idx="1"/>
+          </p:nvPr>
+        </p:nvSpPr>
+        <p:spPr/>
+        <p:txBody>
+          <a:bodyPr/>
+          <a:lstStyle/>
+          <a:p>
+            <a:pPr marL="457200" indent="-457200">
+              <a:buFont typeface="Arial"/>
+              <a:buChar char="•"/>
+            </a:pPr>
+            <a:r>
+              <a:rPr lang="en-US" dirty="0" smtClean="0"/>
+              <a:t>Python does not deal with files directly</a:t>
+            </a:r>
+          </a:p>
+          <a:p>
+            <a:pPr marL="914400" lvl="1" indent="-457200">
+              <a:buFont typeface="Arial"/>
+              <a:buChar char="•"/>
+            </a:pPr>
+            <a:r>
+              <a:rPr lang="en-US" dirty="0" smtClean="0"/>
+              <a:t>We interact with files via special variables, called </a:t>
+            </a:r>
+            <a:r>
+              <a:rPr lang="en-US" b="1" dirty="0" smtClean="0"/>
+              <a:t>handles</a:t>
+            </a:r>
+          </a:p>
+        </p:txBody>
+      </p:sp>
+    </p:spTree>
+    <p:extLst>
+      <p:ext uri="{BB962C8B-B14F-4D97-AF65-F5344CB8AC3E}">
+        <p14:creationId xmlns:p14="http://schemas.microsoft.com/office/powerpoint/2010/main" val="1951906552"/>
+      </p:ext>
+    </p:extLst>
+  </p:cSld>
+  <p:clrMapOvr>
+    <a:masterClrMapping/>
+  </p:clrMapOvr>
+  <p:timing>
+    <p:tnLst>
+      <p:par>
+        <p:cTn xmlns:p14="http://schemas.microsoft.com/office/powerpoint/2010/main" id="1" dur="indefinite" restart="never" nodeType="tmRoot"/>
+      </p:par>
+    </p:tnLst>
+  </p:timing>
+</p:sld>
+</file>
+
+<file path=ppt/slides/slide30.xml><?xml version="1.0" encoding="utf-8"?>
+<p:sld xmlns:a="http://schemas.openxmlformats.org/drawingml/2006/main" xmlns:r="http://schemas.openxmlformats.org/officeDocument/2006/relationships" xmlns:p="http://schemas.openxmlformats.org/presentationml/2006/main">
+  <p:cSld>
+    <p:spTree>
+      <p:nvGrpSpPr>
+        <p:cNvPr id="1" name=""/>
+        <p:cNvGrpSpPr/>
+        <p:nvPr/>
+      </p:nvGrpSpPr>
+      <p:grpSpPr>
+        <a:xfrm>
+          <a:off x="0" y="0"/>
+          <a:ext cx="0" cy="0"/>
+          <a:chOff x="0" y="0"/>
+          <a:chExt cx="0" cy="0"/>
+        </a:xfrm>
+      </p:grpSpPr>
+      <p:sp>
+        <p:nvSpPr>
+          <p:cNvPr id="2" name="Title 1"/>
+          <p:cNvSpPr>
+            <a:spLocks noGrp="1"/>
+          </p:cNvSpPr>
+          <p:nvPr>
+            <p:ph type="title"/>
+          </p:nvPr>
+        </p:nvSpPr>
+        <p:spPr/>
+        <p:txBody>
+          <a:bodyPr/>
+          <a:lstStyle/>
+          <a:p>
+            <a:r>
+              <a:rPr lang="en-US" dirty="0" smtClean="0"/>
               <a:t>a note on scope</a:t>
             </a:r>
             <a:endParaRPr lang="en-US" dirty="0"/>
@@ -10243,7 +10950,7 @@
 </p:sld>
 </file>
 
-<file path=ppt/slides/slide29.xml><?xml version="1.0" encoding="utf-8"?>
+<file path=ppt/slides/slide31.xml><?xml version="1.0" encoding="utf-8"?>
 <p:sld xmlns:a="http://schemas.openxmlformats.org/drawingml/2006/main" xmlns:r="http://schemas.openxmlformats.org/officeDocument/2006/relationships" xmlns:p="http://schemas.openxmlformats.org/presentationml/2006/main">
   <p:cSld>
     <p:spTree>
@@ -10922,107 +11629,7 @@
 </p:sld>
 </file>
 
-<file path=ppt/slides/slide3.xml><?xml version="1.0" encoding="utf-8"?>
-<p:sld xmlns:a="http://schemas.openxmlformats.org/drawingml/2006/main" xmlns:r="http://schemas.openxmlformats.org/officeDocument/2006/relationships" xmlns:p="http://schemas.openxmlformats.org/presentationml/2006/main">
-  <p:cSld>
-    <p:spTree>
-      <p:nvGrpSpPr>
-        <p:cNvPr id="1" name=""/>
-        <p:cNvGrpSpPr/>
-        <p:nvPr/>
-      </p:nvGrpSpPr>
-      <p:grpSpPr>
-        <a:xfrm>
-          <a:off x="0" y="0"/>
-          <a:ext cx="0" cy="0"/>
-          <a:chOff x="0" y="0"/>
-          <a:chExt cx="0" cy="0"/>
-        </a:xfrm>
-      </p:grpSpPr>
-      <p:sp>
-        <p:nvSpPr>
-          <p:cNvPr id="2" name="Title 1"/>
-          <p:cNvSpPr>
-            <a:spLocks noGrp="1"/>
-          </p:cNvSpPr>
-          <p:nvPr>
-            <p:ph type="title"/>
-          </p:nvPr>
-        </p:nvSpPr>
-        <p:spPr/>
-        <p:txBody>
-          <a:bodyPr/>
-          <a:lstStyle/>
-          <a:p>
-            <a:r>
-              <a:rPr lang="en-US" dirty="0" smtClean="0"/>
-              <a:t>reading and writing files in python</a:t>
-            </a:r>
-            <a:endParaRPr lang="en-US" dirty="0"/>
-          </a:p>
-        </p:txBody>
-      </p:sp>
-      <p:sp>
-        <p:nvSpPr>
-          <p:cNvPr id="3" name="Content Placeholder 2"/>
-          <p:cNvSpPr>
-            <a:spLocks noGrp="1"/>
-          </p:cNvSpPr>
-          <p:nvPr>
-            <p:ph idx="1"/>
-          </p:nvPr>
-        </p:nvSpPr>
-        <p:spPr/>
-        <p:txBody>
-          <a:bodyPr/>
-          <a:lstStyle/>
-          <a:p>
-            <a:pPr marL="457200" indent="-457200">
-              <a:buFont typeface="Arial"/>
-              <a:buChar char="•"/>
-            </a:pPr>
-            <a:r>
-              <a:rPr lang="en-US" dirty="0" smtClean="0"/>
-              <a:t>Python does not deal with files directly</a:t>
-            </a:r>
-          </a:p>
-          <a:p>
-            <a:pPr marL="914400" lvl="1" indent="-457200">
-              <a:buFont typeface="Arial"/>
-              <a:buChar char="•"/>
-            </a:pPr>
-            <a:r>
-              <a:rPr lang="en-US" dirty="0" smtClean="0"/>
-              <a:t>We interact with files via special variables, called </a:t>
-            </a:r>
-            <a:r>
-              <a:rPr lang="en-US" b="1" dirty="0" smtClean="0"/>
-              <a:t>handles</a:t>
-            </a:r>
-          </a:p>
-        </p:txBody>
-      </p:sp>
-    </p:spTree>
-    <p:extLst>
-      <p:ext uri="{BB962C8B-B14F-4D97-AF65-F5344CB8AC3E}">
-        <p14:creationId xmlns:p14="http://schemas.microsoft.com/office/powerpoint/2010/main" val="1951906552"/>
-      </p:ext>
-    </p:extLst>
-  </p:cSld>
-  <p:clrMapOvr>
-    <a:masterClrMapping/>
-  </p:clrMapOvr>
-  <p:timing>
-    <p:tnLst>
-      <p:par>
-        <p:cTn xmlns:p14="http://schemas.microsoft.com/office/powerpoint/2010/main" id="1" dur="indefinite" restart="never" nodeType="tmRoot"/>
-      </p:par>
-    </p:tnLst>
-  </p:timing>
-</p:sld>
-</file>
-
-<file path=ppt/slides/slide30.xml><?xml version="1.0" encoding="utf-8"?>
+<file path=ppt/slides/slide32.xml><?xml version="1.0" encoding="utf-8"?>
 <p:sld xmlns:a="http://schemas.openxmlformats.org/drawingml/2006/main" xmlns:r="http://schemas.openxmlformats.org/officeDocument/2006/relationships" xmlns:p="http://schemas.openxmlformats.org/presentationml/2006/main">
   <p:cSld>
     <p:spTree>
@@ -11765,7 +12372,7 @@
 </p:sld>
 </file>
 
-<file path=ppt/slides/slide31.xml><?xml version="1.0" encoding="utf-8"?>
+<file path=ppt/slides/slide33.xml><?xml version="1.0" encoding="utf-8"?>
 <p:sld xmlns:a="http://schemas.openxmlformats.org/drawingml/2006/main" xmlns:r="http://schemas.openxmlformats.org/officeDocument/2006/relationships" xmlns:p="http://schemas.openxmlformats.org/presentationml/2006/main">
   <p:cSld>
     <p:spTree>
@@ -12171,7 +12778,7 @@
                 <a:latin typeface="Monaco"/>
                 <a:cs typeface="Monaco"/>
               </a:rPr>
-              <a:t>.read()</a:t>
+              <a:t>read()</a:t>
             </a:r>
             <a:r>
               <a:rPr lang="en-US" dirty="0">
@@ -12381,7 +12988,7 @@
                 <a:latin typeface="Monaco"/>
                 <a:cs typeface="Monaco"/>
               </a:rPr>
-              <a:t>.open() </a:t>
+              <a:t>open() </a:t>
             </a:r>
             <a:r>
               <a:rPr lang="en-US" dirty="0" smtClean="0">
@@ -12691,7 +13298,7 @@
                 <a:latin typeface="Monaco"/>
                 <a:cs typeface="Monaco"/>
               </a:rPr>
-              <a:t>.open() </a:t>
+              <a:t>open() </a:t>
             </a:r>
             <a:r>
               <a:rPr lang="en-US" dirty="0" smtClean="0">
@@ -14116,7 +14723,7 @@
                 <a:latin typeface="Monaco"/>
                 <a:cs typeface="Monaco"/>
               </a:rPr>
-              <a:t>.open() </a:t>
+              <a:t>open() </a:t>
             </a:r>
             <a:r>
               <a:rPr lang="en-US" dirty="0" smtClean="0">

</xml_diff>